<commit_message>
VISTA-404 occupancy state timeline
</commit_message>
<xml_diff>
--- a/src/docs/UnitOcupancyStateDiagram.pptx
+++ b/src/docs/UnitOcupancyStateDiagram.pptx
@@ -6,6 +6,7 @@
   </p:sldMasterIdLst>
   <p:sldIdLst>
     <p:sldId id="256" r:id="rId2"/>
+    <p:sldId id="257" r:id="rId3"/>
   </p:sldIdLst>
   <p:sldSz cx="9144000" cy="6858000" type="screen4x3"/>
   <p:notesSz cx="6858000" cy="9144000"/>
@@ -288,7 +289,8 @@
           <a:p>
             <a:fld id="{11D8028D-FB8E-49D4-8A9D-03A54A4F29EC}" type="datetimeFigureOut">
               <a:rPr lang="en-US" smtClean="0"/>
-              <a:t>6/18/2011</a:t>
+              <a:pPr/>
+              <a:t>6/20/2011</a:t>
             </a:fld>
             <a:endParaRPr lang="en-US"/>
           </a:p>
@@ -330,6 +332,7 @@
           <a:p>
             <a:fld id="{017D4E28-CB20-4A45-B7D1-4DAC490FF825}" type="slidenum">
               <a:rPr lang="en-US" smtClean="0"/>
+              <a:pPr/>
               <a:t>‹#›</a:t>
             </a:fld>
             <a:endParaRPr lang="en-US"/>
@@ -453,7 +456,8 @@
           <a:p>
             <a:fld id="{11D8028D-FB8E-49D4-8A9D-03A54A4F29EC}" type="datetimeFigureOut">
               <a:rPr lang="en-US" smtClean="0"/>
-              <a:t>6/18/2011</a:t>
+              <a:pPr/>
+              <a:t>6/20/2011</a:t>
             </a:fld>
             <a:endParaRPr lang="en-US"/>
           </a:p>
@@ -495,6 +499,7 @@
           <a:p>
             <a:fld id="{017D4E28-CB20-4A45-B7D1-4DAC490FF825}" type="slidenum">
               <a:rPr lang="en-US" smtClean="0"/>
+              <a:pPr/>
               <a:t>‹#›</a:t>
             </a:fld>
             <a:endParaRPr lang="en-US"/>
@@ -628,7 +633,8 @@
           <a:p>
             <a:fld id="{11D8028D-FB8E-49D4-8A9D-03A54A4F29EC}" type="datetimeFigureOut">
               <a:rPr lang="en-US" smtClean="0"/>
-              <a:t>6/18/2011</a:t>
+              <a:pPr/>
+              <a:t>6/20/2011</a:t>
             </a:fld>
             <a:endParaRPr lang="en-US"/>
           </a:p>
@@ -670,6 +676,7 @@
           <a:p>
             <a:fld id="{017D4E28-CB20-4A45-B7D1-4DAC490FF825}" type="slidenum">
               <a:rPr lang="en-US" smtClean="0"/>
+              <a:pPr/>
               <a:t>‹#›</a:t>
             </a:fld>
             <a:endParaRPr lang="en-US"/>
@@ -793,7 +800,8 @@
           <a:p>
             <a:fld id="{11D8028D-FB8E-49D4-8A9D-03A54A4F29EC}" type="datetimeFigureOut">
               <a:rPr lang="en-US" smtClean="0"/>
-              <a:t>6/18/2011</a:t>
+              <a:pPr/>
+              <a:t>6/20/2011</a:t>
             </a:fld>
             <a:endParaRPr lang="en-US"/>
           </a:p>
@@ -835,6 +843,7 @@
           <a:p>
             <a:fld id="{017D4E28-CB20-4A45-B7D1-4DAC490FF825}" type="slidenum">
               <a:rPr lang="en-US" smtClean="0"/>
+              <a:pPr/>
               <a:t>‹#›</a:t>
             </a:fld>
             <a:endParaRPr lang="en-US"/>
@@ -1034,7 +1043,8 @@
           <a:p>
             <a:fld id="{11D8028D-FB8E-49D4-8A9D-03A54A4F29EC}" type="datetimeFigureOut">
               <a:rPr lang="en-US" smtClean="0"/>
-              <a:t>6/18/2011</a:t>
+              <a:pPr/>
+              <a:t>6/20/2011</a:t>
             </a:fld>
             <a:endParaRPr lang="en-US"/>
           </a:p>
@@ -1076,6 +1086,7 @@
           <a:p>
             <a:fld id="{017D4E28-CB20-4A45-B7D1-4DAC490FF825}" type="slidenum">
               <a:rPr lang="en-US" smtClean="0"/>
+              <a:pPr/>
               <a:t>‹#›</a:t>
             </a:fld>
             <a:endParaRPr lang="en-US"/>
@@ -1317,7 +1328,8 @@
           <a:p>
             <a:fld id="{11D8028D-FB8E-49D4-8A9D-03A54A4F29EC}" type="datetimeFigureOut">
               <a:rPr lang="en-US" smtClean="0"/>
-              <a:t>6/18/2011</a:t>
+              <a:pPr/>
+              <a:t>6/20/2011</a:t>
             </a:fld>
             <a:endParaRPr lang="en-US"/>
           </a:p>
@@ -1359,6 +1371,7 @@
           <a:p>
             <a:fld id="{017D4E28-CB20-4A45-B7D1-4DAC490FF825}" type="slidenum">
               <a:rPr lang="en-US" smtClean="0"/>
+              <a:pPr/>
               <a:t>‹#›</a:t>
             </a:fld>
             <a:endParaRPr lang="en-US"/>
@@ -1734,7 +1747,8 @@
           <a:p>
             <a:fld id="{11D8028D-FB8E-49D4-8A9D-03A54A4F29EC}" type="datetimeFigureOut">
               <a:rPr lang="en-US" smtClean="0"/>
-              <a:t>6/18/2011</a:t>
+              <a:pPr/>
+              <a:t>6/20/2011</a:t>
             </a:fld>
             <a:endParaRPr lang="en-US"/>
           </a:p>
@@ -1776,6 +1790,7 @@
           <a:p>
             <a:fld id="{017D4E28-CB20-4A45-B7D1-4DAC490FF825}" type="slidenum">
               <a:rPr lang="en-US" smtClean="0"/>
+              <a:pPr/>
               <a:t>‹#›</a:t>
             </a:fld>
             <a:endParaRPr lang="en-US"/>
@@ -1847,7 +1862,8 @@
           <a:p>
             <a:fld id="{11D8028D-FB8E-49D4-8A9D-03A54A4F29EC}" type="datetimeFigureOut">
               <a:rPr lang="en-US" smtClean="0"/>
-              <a:t>6/18/2011</a:t>
+              <a:pPr/>
+              <a:t>6/20/2011</a:t>
             </a:fld>
             <a:endParaRPr lang="en-US"/>
           </a:p>
@@ -1889,6 +1905,7 @@
           <a:p>
             <a:fld id="{017D4E28-CB20-4A45-B7D1-4DAC490FF825}" type="slidenum">
               <a:rPr lang="en-US" smtClean="0"/>
+              <a:pPr/>
               <a:t>‹#›</a:t>
             </a:fld>
             <a:endParaRPr lang="en-US"/>
@@ -1937,7 +1954,8 @@
           <a:p>
             <a:fld id="{11D8028D-FB8E-49D4-8A9D-03A54A4F29EC}" type="datetimeFigureOut">
               <a:rPr lang="en-US" smtClean="0"/>
-              <a:t>6/18/2011</a:t>
+              <a:pPr/>
+              <a:t>6/20/2011</a:t>
             </a:fld>
             <a:endParaRPr lang="en-US"/>
           </a:p>
@@ -1979,6 +1997,7 @@
           <a:p>
             <a:fld id="{017D4E28-CB20-4A45-B7D1-4DAC490FF825}" type="slidenum">
               <a:rPr lang="en-US" smtClean="0"/>
+              <a:pPr/>
               <a:t>‹#›</a:t>
             </a:fld>
             <a:endParaRPr lang="en-US"/>
@@ -2209,7 +2228,8 @@
           <a:p>
             <a:fld id="{11D8028D-FB8E-49D4-8A9D-03A54A4F29EC}" type="datetimeFigureOut">
               <a:rPr lang="en-US" smtClean="0"/>
-              <a:t>6/18/2011</a:t>
+              <a:pPr/>
+              <a:t>6/20/2011</a:t>
             </a:fld>
             <a:endParaRPr lang="en-US"/>
           </a:p>
@@ -2251,6 +2271,7 @@
           <a:p>
             <a:fld id="{017D4E28-CB20-4A45-B7D1-4DAC490FF825}" type="slidenum">
               <a:rPr lang="en-US" smtClean="0"/>
+              <a:pPr/>
               <a:t>‹#›</a:t>
             </a:fld>
             <a:endParaRPr lang="en-US"/>
@@ -2457,7 +2478,8 @@
           <a:p>
             <a:fld id="{11D8028D-FB8E-49D4-8A9D-03A54A4F29EC}" type="datetimeFigureOut">
               <a:rPr lang="en-US" smtClean="0"/>
-              <a:t>6/18/2011</a:t>
+              <a:pPr/>
+              <a:t>6/20/2011</a:t>
             </a:fld>
             <a:endParaRPr lang="en-US"/>
           </a:p>
@@ -2499,6 +2521,7 @@
           <a:p>
             <a:fld id="{017D4E28-CB20-4A45-B7D1-4DAC490FF825}" type="slidenum">
               <a:rPr lang="en-US" smtClean="0"/>
+              <a:pPr/>
               <a:t>‹#›</a:t>
             </a:fld>
             <a:endParaRPr lang="en-US"/>
@@ -2665,7 +2688,8 @@
           <a:p>
             <a:fld id="{11D8028D-FB8E-49D4-8A9D-03A54A4F29EC}" type="datetimeFigureOut">
               <a:rPr lang="en-US" smtClean="0"/>
-              <a:t>6/18/2011</a:t>
+              <a:pPr/>
+              <a:t>6/20/2011</a:t>
             </a:fld>
             <a:endParaRPr lang="en-US"/>
           </a:p>
@@ -2743,6 +2767,7 @@
           <a:p>
             <a:fld id="{017D4E28-CB20-4A45-B7D1-4DAC490FF825}" type="slidenum">
               <a:rPr lang="en-US" smtClean="0"/>
+              <a:pPr/>
               <a:t>‹#›</a:t>
             </a:fld>
             <a:endParaRPr lang="en-US"/>
@@ -3951,6 +3976,2068 @@
               <a:rPr lang="en-US" dirty="0" smtClean="0"/>
               <a:t>Lease</a:t>
             </a:r>
+          </a:p>
+        </p:txBody>
+      </p:sp>
+    </p:spTree>
+  </p:cSld>
+  <p:clrMapOvr>
+    <a:masterClrMapping/>
+  </p:clrMapOvr>
+</p:sld>
+</file>
+
+<file path=ppt/slides/slide2.xml><?xml version="1.0" encoding="utf-8"?>
+<p:sld xmlns:a="http://schemas.openxmlformats.org/drawingml/2006/main" xmlns:r="http://schemas.openxmlformats.org/officeDocument/2006/relationships" xmlns:p="http://schemas.openxmlformats.org/presentationml/2006/main">
+  <p:cSld>
+    <p:spTree>
+      <p:nvGrpSpPr>
+        <p:cNvPr id="1" name=""/>
+        <p:cNvGrpSpPr/>
+        <p:nvPr/>
+      </p:nvGrpSpPr>
+      <p:grpSpPr>
+        <a:xfrm>
+          <a:off x="0" y="0"/>
+          <a:ext cx="0" cy="0"/>
+          <a:chOff x="0" y="0"/>
+          <a:chExt cx="0" cy="0"/>
+        </a:xfrm>
+      </p:grpSpPr>
+      <p:sp>
+        <p:nvSpPr>
+          <p:cNvPr id="4" name="Rectangle 3"/>
+          <p:cNvSpPr/>
+          <p:nvPr/>
+        </p:nvSpPr>
+        <p:spPr>
+          <a:xfrm>
+            <a:off x="609600" y="685800"/>
+            <a:ext cx="3467100" cy="228600"/>
+          </a:xfrm>
+          <a:prstGeom prst="rect">
+            <a:avLst/>
+          </a:prstGeom>
+          <a:gradFill>
+            <a:gsLst>
+              <a:gs pos="0">
+                <a:schemeClr val="accent1">
+                  <a:lumMod val="75000"/>
+                </a:schemeClr>
+              </a:gs>
+              <a:gs pos="50000">
+                <a:schemeClr val="accent1">
+                  <a:tint val="44500"/>
+                  <a:satMod val="160000"/>
+                </a:schemeClr>
+              </a:gs>
+              <a:gs pos="100000">
+                <a:schemeClr val="accent1">
+                  <a:tint val="23500"/>
+                  <a:satMod val="160000"/>
+                </a:schemeClr>
+              </a:gs>
+            </a:gsLst>
+            <a:lin ang="0" scaled="1"/>
+          </a:gradFill>
+          <a:ln>
+            <a:gradFill flip="none" rotWithShape="1">
+              <a:gsLst>
+                <a:gs pos="0">
+                  <a:schemeClr val="tx2">
+                    <a:lumMod val="50000"/>
+                  </a:schemeClr>
+                </a:gs>
+                <a:gs pos="50000">
+                  <a:schemeClr val="accent1">
+                    <a:tint val="44500"/>
+                    <a:satMod val="160000"/>
+                  </a:schemeClr>
+                </a:gs>
+                <a:gs pos="100000">
+                  <a:schemeClr val="accent1">
+                    <a:tint val="23500"/>
+                    <a:satMod val="160000"/>
+                  </a:schemeClr>
+                </a:gs>
+              </a:gsLst>
+              <a:lin ang="0" scaled="1"/>
+              <a:tileRect/>
+            </a:gradFill>
+          </a:ln>
+        </p:spPr>
+        <p:style>
+          <a:lnRef idx="2">
+            <a:schemeClr val="accent1">
+              <a:shade val="50000"/>
+            </a:schemeClr>
+          </a:lnRef>
+          <a:fillRef idx="1">
+            <a:schemeClr val="accent1"/>
+          </a:fillRef>
+          <a:effectRef idx="0">
+            <a:schemeClr val="accent1"/>
+          </a:effectRef>
+          <a:fontRef idx="minor">
+            <a:schemeClr val="lt1"/>
+          </a:fontRef>
+        </p:style>
+        <p:txBody>
+          <a:bodyPr rtlCol="0" anchor="ctr"/>
+          <a:lstStyle/>
+          <a:p>
+            <a:pPr algn="ctr"/>
+            <a:r>
+              <a:rPr lang="en-US" dirty="0" smtClean="0"/>
+              <a:t>Leased</a:t>
+            </a:r>
+            <a:endParaRPr lang="en-US" dirty="0"/>
+          </a:p>
+        </p:txBody>
+      </p:sp>
+      <p:sp>
+        <p:nvSpPr>
+          <p:cNvPr id="5" name="Rectangle 4"/>
+          <p:cNvSpPr/>
+          <p:nvPr/>
+        </p:nvSpPr>
+        <p:spPr>
+          <a:xfrm>
+            <a:off x="609600" y="990600"/>
+            <a:ext cx="3467100" cy="76200"/>
+          </a:xfrm>
+          <a:prstGeom prst="rect">
+            <a:avLst/>
+          </a:prstGeom>
+          <a:noFill/>
+          <a:ln>
+            <a:solidFill>
+              <a:schemeClr val="accent3">
+                <a:lumMod val="75000"/>
+              </a:schemeClr>
+            </a:solidFill>
+          </a:ln>
+        </p:spPr>
+        <p:style>
+          <a:lnRef idx="2">
+            <a:schemeClr val="accent1">
+              <a:shade val="50000"/>
+            </a:schemeClr>
+          </a:lnRef>
+          <a:fillRef idx="1">
+            <a:schemeClr val="accent1"/>
+          </a:fillRef>
+          <a:effectRef idx="0">
+            <a:schemeClr val="accent1"/>
+          </a:effectRef>
+          <a:fontRef idx="minor">
+            <a:schemeClr val="lt1"/>
+          </a:fontRef>
+        </p:style>
+        <p:txBody>
+          <a:bodyPr rtlCol="0" anchor="ctr"/>
+          <a:lstStyle/>
+          <a:p>
+            <a:pPr algn="ctr"/>
+            <a:endParaRPr lang="en-US"/>
+          </a:p>
+        </p:txBody>
+      </p:sp>
+      <p:sp>
+        <p:nvSpPr>
+          <p:cNvPr id="6" name="Rectangle 5"/>
+          <p:cNvSpPr/>
+          <p:nvPr/>
+        </p:nvSpPr>
+        <p:spPr>
+          <a:xfrm>
+            <a:off x="609600" y="990600"/>
+            <a:ext cx="685800" cy="76200"/>
+          </a:xfrm>
+          <a:prstGeom prst="rect">
+            <a:avLst/>
+          </a:prstGeom>
+          <a:solidFill>
+            <a:schemeClr val="accent3">
+              <a:lumMod val="60000"/>
+              <a:lumOff val="40000"/>
+            </a:schemeClr>
+          </a:solidFill>
+          <a:ln>
+            <a:solidFill>
+              <a:schemeClr val="accent3">
+                <a:lumMod val="75000"/>
+              </a:schemeClr>
+            </a:solidFill>
+          </a:ln>
+        </p:spPr>
+        <p:style>
+          <a:lnRef idx="2">
+            <a:schemeClr val="accent1">
+              <a:shade val="50000"/>
+            </a:schemeClr>
+          </a:lnRef>
+          <a:fillRef idx="1">
+            <a:schemeClr val="accent1"/>
+          </a:fillRef>
+          <a:effectRef idx="0">
+            <a:schemeClr val="accent1"/>
+          </a:effectRef>
+          <a:fontRef idx="minor">
+            <a:schemeClr val="lt1"/>
+          </a:fontRef>
+        </p:style>
+        <p:txBody>
+          <a:bodyPr rtlCol="0" anchor="ctr"/>
+          <a:lstStyle/>
+          <a:p>
+            <a:pPr algn="ctr"/>
+            <a:endParaRPr lang="en-US"/>
+          </a:p>
+        </p:txBody>
+      </p:sp>
+      <p:sp>
+        <p:nvSpPr>
+          <p:cNvPr id="8" name="Down Arrow 7"/>
+          <p:cNvSpPr/>
+          <p:nvPr/>
+        </p:nvSpPr>
+        <p:spPr>
+          <a:xfrm rot="10800000">
+            <a:off x="1219200" y="1106741"/>
+            <a:ext cx="152400" cy="188658"/>
+          </a:xfrm>
+          <a:prstGeom prst="downArrow">
+            <a:avLst/>
+          </a:prstGeom>
+        </p:spPr>
+        <p:style>
+          <a:lnRef idx="2">
+            <a:schemeClr val="accent1">
+              <a:shade val="50000"/>
+            </a:schemeClr>
+          </a:lnRef>
+          <a:fillRef idx="1">
+            <a:schemeClr val="accent1"/>
+          </a:fillRef>
+          <a:effectRef idx="0">
+            <a:schemeClr val="accent1"/>
+          </a:effectRef>
+          <a:fontRef idx="minor">
+            <a:schemeClr val="lt1"/>
+          </a:fontRef>
+        </p:style>
+        <p:txBody>
+          <a:bodyPr rtlCol="0" anchor="ctr"/>
+          <a:lstStyle/>
+          <a:p>
+            <a:pPr algn="ctr"/>
+            <a:endParaRPr lang="en-US"/>
+          </a:p>
+        </p:txBody>
+      </p:sp>
+      <p:sp>
+        <p:nvSpPr>
+          <p:cNvPr id="9" name="TextBox 8"/>
+          <p:cNvSpPr txBox="1"/>
+          <p:nvPr/>
+        </p:nvSpPr>
+        <p:spPr>
+          <a:xfrm>
+            <a:off x="990600" y="1219200"/>
+            <a:ext cx="990599" cy="276999"/>
+          </a:xfrm>
+          <a:prstGeom prst="rect">
+            <a:avLst/>
+          </a:prstGeom>
+          <a:noFill/>
+        </p:spPr>
+        <p:txBody>
+          <a:bodyPr wrap="square" rtlCol="0">
+            <a:spAutoFit/>
+          </a:bodyPr>
+          <a:lstStyle/>
+          <a:p>
+            <a:r>
+              <a:rPr lang="en-US" sz="1200" dirty="0" smtClean="0"/>
+              <a:t>Notice</a:t>
+            </a:r>
+          </a:p>
+        </p:txBody>
+      </p:sp>
+      <p:sp>
+        <p:nvSpPr>
+          <p:cNvPr id="14" name="Rectangle 13"/>
+          <p:cNvSpPr/>
+          <p:nvPr/>
+        </p:nvSpPr>
+        <p:spPr>
+          <a:xfrm>
+            <a:off x="5257800" y="685800"/>
+            <a:ext cx="990600" cy="228600"/>
+          </a:xfrm>
+          <a:prstGeom prst="rect">
+            <a:avLst/>
+          </a:prstGeom>
+        </p:spPr>
+        <p:style>
+          <a:lnRef idx="2">
+            <a:schemeClr val="accent1">
+              <a:shade val="50000"/>
+            </a:schemeClr>
+          </a:lnRef>
+          <a:fillRef idx="1">
+            <a:schemeClr val="accent1"/>
+          </a:fillRef>
+          <a:effectRef idx="0">
+            <a:schemeClr val="accent1"/>
+          </a:effectRef>
+          <a:fontRef idx="minor">
+            <a:schemeClr val="lt1"/>
+          </a:fontRef>
+        </p:style>
+        <p:txBody>
+          <a:bodyPr rtlCol="0" anchor="ctr"/>
+          <a:lstStyle/>
+          <a:p>
+            <a:pPr algn="ctr"/>
+            <a:r>
+              <a:rPr lang="en-US" dirty="0" smtClean="0"/>
+              <a:t>Leased</a:t>
+            </a:r>
+            <a:endParaRPr lang="en-US" dirty="0"/>
+          </a:p>
+        </p:txBody>
+      </p:sp>
+      <p:sp>
+        <p:nvSpPr>
+          <p:cNvPr id="15" name="Rectangle 14"/>
+          <p:cNvSpPr/>
+          <p:nvPr/>
+        </p:nvSpPr>
+        <p:spPr>
+          <a:xfrm>
+            <a:off x="5257800" y="990600"/>
+            <a:ext cx="3467100" cy="76200"/>
+          </a:xfrm>
+          <a:prstGeom prst="rect">
+            <a:avLst/>
+          </a:prstGeom>
+          <a:noFill/>
+          <a:ln>
+            <a:solidFill>
+              <a:schemeClr val="accent3">
+                <a:lumMod val="75000"/>
+              </a:schemeClr>
+            </a:solidFill>
+          </a:ln>
+        </p:spPr>
+        <p:style>
+          <a:lnRef idx="2">
+            <a:schemeClr val="accent1">
+              <a:shade val="50000"/>
+            </a:schemeClr>
+          </a:lnRef>
+          <a:fillRef idx="1">
+            <a:schemeClr val="accent1"/>
+          </a:fillRef>
+          <a:effectRef idx="0">
+            <a:schemeClr val="accent1"/>
+          </a:effectRef>
+          <a:fontRef idx="minor">
+            <a:schemeClr val="lt1"/>
+          </a:fontRef>
+        </p:style>
+        <p:txBody>
+          <a:bodyPr rtlCol="0" anchor="ctr"/>
+          <a:lstStyle/>
+          <a:p>
+            <a:pPr algn="ctr"/>
+            <a:endParaRPr lang="en-US"/>
+          </a:p>
+        </p:txBody>
+      </p:sp>
+      <p:sp>
+        <p:nvSpPr>
+          <p:cNvPr id="16" name="Rectangle 15"/>
+          <p:cNvSpPr/>
+          <p:nvPr/>
+        </p:nvSpPr>
+        <p:spPr>
+          <a:xfrm>
+            <a:off x="5257800" y="990600"/>
+            <a:ext cx="685800" cy="76200"/>
+          </a:xfrm>
+          <a:prstGeom prst="rect">
+            <a:avLst/>
+          </a:prstGeom>
+          <a:solidFill>
+            <a:schemeClr val="accent3">
+              <a:lumMod val="60000"/>
+              <a:lumOff val="40000"/>
+            </a:schemeClr>
+          </a:solidFill>
+          <a:ln>
+            <a:solidFill>
+              <a:schemeClr val="accent3">
+                <a:lumMod val="75000"/>
+              </a:schemeClr>
+            </a:solidFill>
+          </a:ln>
+        </p:spPr>
+        <p:style>
+          <a:lnRef idx="2">
+            <a:schemeClr val="accent1">
+              <a:shade val="50000"/>
+            </a:schemeClr>
+          </a:lnRef>
+          <a:fillRef idx="1">
+            <a:schemeClr val="accent1"/>
+          </a:fillRef>
+          <a:effectRef idx="0">
+            <a:schemeClr val="accent1"/>
+          </a:effectRef>
+          <a:fontRef idx="minor">
+            <a:schemeClr val="lt1"/>
+          </a:fontRef>
+        </p:style>
+        <p:txBody>
+          <a:bodyPr rtlCol="0" anchor="ctr"/>
+          <a:lstStyle/>
+          <a:p>
+            <a:pPr algn="ctr"/>
+            <a:endParaRPr lang="en-US"/>
+          </a:p>
+        </p:txBody>
+      </p:sp>
+      <p:sp>
+        <p:nvSpPr>
+          <p:cNvPr id="17" name="Rectangle 16"/>
+          <p:cNvSpPr/>
+          <p:nvPr/>
+        </p:nvSpPr>
+        <p:spPr>
+          <a:xfrm>
+            <a:off x="6248400" y="685800"/>
+            <a:ext cx="2514600" cy="228600"/>
+          </a:xfrm>
+          <a:prstGeom prst="rect">
+            <a:avLst/>
+          </a:prstGeom>
+          <a:gradFill>
+            <a:gsLst>
+              <a:gs pos="0">
+                <a:schemeClr val="accent1">
+                  <a:lumMod val="75000"/>
+                </a:schemeClr>
+              </a:gs>
+              <a:gs pos="50000">
+                <a:schemeClr val="accent1">
+                  <a:tint val="44500"/>
+                  <a:satMod val="160000"/>
+                </a:schemeClr>
+              </a:gs>
+              <a:gs pos="100000">
+                <a:schemeClr val="accent1">
+                  <a:tint val="23500"/>
+                  <a:satMod val="160000"/>
+                </a:schemeClr>
+              </a:gs>
+            </a:gsLst>
+            <a:lin ang="0" scaled="1"/>
+          </a:gradFill>
+          <a:ln>
+            <a:gradFill flip="none" rotWithShape="1">
+              <a:gsLst>
+                <a:gs pos="0">
+                  <a:schemeClr val="tx2">
+                    <a:lumMod val="50000"/>
+                  </a:schemeClr>
+                </a:gs>
+                <a:gs pos="50000">
+                  <a:schemeClr val="accent1">
+                    <a:tint val="44500"/>
+                    <a:satMod val="160000"/>
+                  </a:schemeClr>
+                </a:gs>
+                <a:gs pos="100000">
+                  <a:schemeClr val="accent1">
+                    <a:tint val="23500"/>
+                    <a:satMod val="160000"/>
+                  </a:schemeClr>
+                </a:gs>
+              </a:gsLst>
+              <a:lin ang="0" scaled="1"/>
+              <a:tileRect/>
+            </a:gradFill>
+          </a:ln>
+        </p:spPr>
+        <p:style>
+          <a:lnRef idx="2">
+            <a:schemeClr val="accent1">
+              <a:shade val="50000"/>
+            </a:schemeClr>
+          </a:lnRef>
+          <a:fillRef idx="1">
+            <a:schemeClr val="accent1"/>
+          </a:fillRef>
+          <a:effectRef idx="0">
+            <a:schemeClr val="accent1"/>
+          </a:effectRef>
+          <a:fontRef idx="minor">
+            <a:schemeClr val="lt1"/>
+          </a:fontRef>
+        </p:style>
+        <p:txBody>
+          <a:bodyPr rtlCol="0" anchor="ctr"/>
+          <a:lstStyle/>
+          <a:p>
+            <a:pPr algn="ctr"/>
+            <a:r>
+              <a:rPr lang="en-US" dirty="0" smtClean="0"/>
+              <a:t>Vacant</a:t>
+            </a:r>
+            <a:endParaRPr lang="en-US" dirty="0"/>
+          </a:p>
+        </p:txBody>
+      </p:sp>
+      <p:sp>
+        <p:nvSpPr>
+          <p:cNvPr id="18" name="Right Arrow 17"/>
+          <p:cNvSpPr/>
+          <p:nvPr/>
+        </p:nvSpPr>
+        <p:spPr>
+          <a:xfrm>
+            <a:off x="4495800" y="762000"/>
+            <a:ext cx="426719" cy="304800"/>
+          </a:xfrm>
+          <a:prstGeom prst="rightArrow">
+            <a:avLst/>
+          </a:prstGeom>
+        </p:spPr>
+        <p:style>
+          <a:lnRef idx="2">
+            <a:schemeClr val="accent1">
+              <a:shade val="50000"/>
+            </a:schemeClr>
+          </a:lnRef>
+          <a:fillRef idx="1">
+            <a:schemeClr val="accent1"/>
+          </a:fillRef>
+          <a:effectRef idx="0">
+            <a:schemeClr val="accent1"/>
+          </a:effectRef>
+          <a:fontRef idx="minor">
+            <a:schemeClr val="lt1"/>
+          </a:fontRef>
+        </p:style>
+        <p:txBody>
+          <a:bodyPr rtlCol="0" anchor="ctr"/>
+          <a:lstStyle/>
+          <a:p>
+            <a:pPr algn="ctr"/>
+            <a:endParaRPr lang="en-US"/>
+          </a:p>
+        </p:txBody>
+      </p:sp>
+      <p:sp>
+        <p:nvSpPr>
+          <p:cNvPr id="23" name="TextBox 22"/>
+          <p:cNvSpPr txBox="1"/>
+          <p:nvPr/>
+        </p:nvSpPr>
+        <p:spPr>
+          <a:xfrm>
+            <a:off x="76200" y="685800"/>
+            <a:ext cx="301686" cy="369332"/>
+          </a:xfrm>
+          <a:prstGeom prst="rect">
+            <a:avLst/>
+          </a:prstGeom>
+          <a:noFill/>
+        </p:spPr>
+        <p:txBody>
+          <a:bodyPr wrap="none" rtlCol="0">
+            <a:spAutoFit/>
+          </a:bodyPr>
+          <a:lstStyle/>
+          <a:p>
+            <a:r>
+              <a:rPr lang="en-US" dirty="0" smtClean="0"/>
+              <a:t>1</a:t>
+            </a:r>
+            <a:endParaRPr lang="en-US" dirty="0"/>
+          </a:p>
+        </p:txBody>
+      </p:sp>
+      <p:sp>
+        <p:nvSpPr>
+          <p:cNvPr id="24" name="TextBox 23"/>
+          <p:cNvSpPr txBox="1"/>
+          <p:nvPr/>
+        </p:nvSpPr>
+        <p:spPr>
+          <a:xfrm>
+            <a:off x="76200" y="1828800"/>
+            <a:ext cx="301686" cy="369332"/>
+          </a:xfrm>
+          <a:prstGeom prst="rect">
+            <a:avLst/>
+          </a:prstGeom>
+          <a:noFill/>
+        </p:spPr>
+        <p:txBody>
+          <a:bodyPr wrap="none" rtlCol="0">
+            <a:spAutoFit/>
+          </a:bodyPr>
+          <a:lstStyle/>
+          <a:p>
+            <a:r>
+              <a:rPr lang="en-US" dirty="0" smtClean="0"/>
+              <a:t>2</a:t>
+            </a:r>
+            <a:endParaRPr lang="en-US" dirty="0"/>
+          </a:p>
+        </p:txBody>
+      </p:sp>
+      <p:sp>
+        <p:nvSpPr>
+          <p:cNvPr id="26" name="Down Arrow 25"/>
+          <p:cNvSpPr/>
+          <p:nvPr/>
+        </p:nvSpPr>
+        <p:spPr>
+          <a:xfrm rot="10800000">
+            <a:off x="1219200" y="2249741"/>
+            <a:ext cx="152400" cy="188658"/>
+          </a:xfrm>
+          <a:prstGeom prst="downArrow">
+            <a:avLst/>
+          </a:prstGeom>
+        </p:spPr>
+        <p:style>
+          <a:lnRef idx="2">
+            <a:schemeClr val="accent1">
+              <a:shade val="50000"/>
+            </a:schemeClr>
+          </a:lnRef>
+          <a:fillRef idx="1">
+            <a:schemeClr val="accent1"/>
+          </a:fillRef>
+          <a:effectRef idx="0">
+            <a:schemeClr val="accent1"/>
+          </a:effectRef>
+          <a:fontRef idx="minor">
+            <a:schemeClr val="lt1"/>
+          </a:fontRef>
+        </p:style>
+        <p:txBody>
+          <a:bodyPr rtlCol="0" anchor="ctr"/>
+          <a:lstStyle/>
+          <a:p>
+            <a:pPr algn="ctr"/>
+            <a:endParaRPr lang="en-US"/>
+          </a:p>
+        </p:txBody>
+      </p:sp>
+      <p:sp>
+        <p:nvSpPr>
+          <p:cNvPr id="27" name="TextBox 26"/>
+          <p:cNvSpPr txBox="1"/>
+          <p:nvPr/>
+        </p:nvSpPr>
+        <p:spPr>
+          <a:xfrm>
+            <a:off x="990600" y="2362200"/>
+            <a:ext cx="990599" cy="276999"/>
+          </a:xfrm>
+          <a:prstGeom prst="rect">
+            <a:avLst/>
+          </a:prstGeom>
+          <a:noFill/>
+        </p:spPr>
+        <p:txBody>
+          <a:bodyPr wrap="square" rtlCol="0">
+            <a:spAutoFit/>
+          </a:bodyPr>
+          <a:lstStyle/>
+          <a:p>
+            <a:r>
+              <a:rPr lang="en-US" sz="1200" dirty="0" smtClean="0"/>
+              <a:t>Scoping</a:t>
+            </a:r>
+          </a:p>
+        </p:txBody>
+      </p:sp>
+      <p:sp>
+        <p:nvSpPr>
+          <p:cNvPr id="29" name="TextBox 28"/>
+          <p:cNvSpPr txBox="1"/>
+          <p:nvPr/>
+        </p:nvSpPr>
+        <p:spPr>
+          <a:xfrm>
+            <a:off x="5410200" y="1143000"/>
+            <a:ext cx="1413272" cy="276999"/>
+          </a:xfrm>
+          <a:prstGeom prst="rect">
+            <a:avLst/>
+          </a:prstGeom>
+          <a:noFill/>
+        </p:spPr>
+        <p:txBody>
+          <a:bodyPr wrap="none" rtlCol="0">
+            <a:spAutoFit/>
+          </a:bodyPr>
+          <a:lstStyle/>
+          <a:p>
+            <a:r>
+              <a:rPr lang="en-US" sz="1200" dirty="0" smtClean="0"/>
+              <a:t>Request for scoping</a:t>
+            </a:r>
+            <a:endParaRPr lang="en-US" sz="1200" dirty="0"/>
+          </a:p>
+        </p:txBody>
+      </p:sp>
+      <p:sp>
+        <p:nvSpPr>
+          <p:cNvPr id="35" name="Right Arrow 34"/>
+          <p:cNvSpPr/>
+          <p:nvPr/>
+        </p:nvSpPr>
+        <p:spPr>
+          <a:xfrm>
+            <a:off x="4419600" y="1905000"/>
+            <a:ext cx="426719" cy="304800"/>
+          </a:xfrm>
+          <a:prstGeom prst="rightArrow">
+            <a:avLst/>
+          </a:prstGeom>
+        </p:spPr>
+        <p:style>
+          <a:lnRef idx="2">
+            <a:schemeClr val="accent1">
+              <a:shade val="50000"/>
+            </a:schemeClr>
+          </a:lnRef>
+          <a:fillRef idx="1">
+            <a:schemeClr val="accent1"/>
+          </a:fillRef>
+          <a:effectRef idx="0">
+            <a:schemeClr val="accent1"/>
+          </a:effectRef>
+          <a:fontRef idx="minor">
+            <a:schemeClr val="lt1"/>
+          </a:fontRef>
+        </p:style>
+        <p:txBody>
+          <a:bodyPr rtlCol="0" anchor="ctr"/>
+          <a:lstStyle/>
+          <a:p>
+            <a:pPr algn="ctr"/>
+            <a:endParaRPr lang="en-US"/>
+          </a:p>
+        </p:txBody>
+      </p:sp>
+      <p:sp>
+        <p:nvSpPr>
+          <p:cNvPr id="37" name="TextBox 36"/>
+          <p:cNvSpPr txBox="1"/>
+          <p:nvPr/>
+        </p:nvSpPr>
+        <p:spPr>
+          <a:xfrm>
+            <a:off x="5334000" y="2362200"/>
+            <a:ext cx="1903085" cy="276999"/>
+          </a:xfrm>
+          <a:prstGeom prst="rect">
+            <a:avLst/>
+          </a:prstGeom>
+          <a:noFill/>
+        </p:spPr>
+        <p:txBody>
+          <a:bodyPr wrap="none" rtlCol="0">
+            <a:spAutoFit/>
+          </a:bodyPr>
+          <a:lstStyle/>
+          <a:p>
+            <a:r>
+              <a:rPr lang="en-US" sz="1200" dirty="0" smtClean="0"/>
+              <a:t>Available for advertisement</a:t>
+            </a:r>
+            <a:endParaRPr lang="en-US" sz="1200" dirty="0"/>
+          </a:p>
+        </p:txBody>
+      </p:sp>
+      <p:sp>
+        <p:nvSpPr>
+          <p:cNvPr id="38" name="Rectangle 37"/>
+          <p:cNvSpPr/>
+          <p:nvPr/>
+        </p:nvSpPr>
+        <p:spPr>
+          <a:xfrm>
+            <a:off x="5181600" y="1828800"/>
+            <a:ext cx="990600" cy="228600"/>
+          </a:xfrm>
+          <a:prstGeom prst="rect">
+            <a:avLst/>
+          </a:prstGeom>
+        </p:spPr>
+        <p:style>
+          <a:lnRef idx="2">
+            <a:schemeClr val="accent1">
+              <a:shade val="50000"/>
+            </a:schemeClr>
+          </a:lnRef>
+          <a:fillRef idx="1">
+            <a:schemeClr val="accent1"/>
+          </a:fillRef>
+          <a:effectRef idx="0">
+            <a:schemeClr val="accent1"/>
+          </a:effectRef>
+          <a:fontRef idx="minor">
+            <a:schemeClr val="lt1"/>
+          </a:fontRef>
+        </p:style>
+        <p:txBody>
+          <a:bodyPr rtlCol="0" anchor="ctr"/>
+          <a:lstStyle/>
+          <a:p>
+            <a:pPr algn="ctr"/>
+            <a:r>
+              <a:rPr lang="en-US" dirty="0" smtClean="0"/>
+              <a:t>Leased</a:t>
+            </a:r>
+            <a:endParaRPr lang="en-US" dirty="0"/>
+          </a:p>
+        </p:txBody>
+      </p:sp>
+      <p:sp>
+        <p:nvSpPr>
+          <p:cNvPr id="39" name="Rectangle 38"/>
+          <p:cNvSpPr/>
+          <p:nvPr/>
+        </p:nvSpPr>
+        <p:spPr>
+          <a:xfrm>
+            <a:off x="5181600" y="2133600"/>
+            <a:ext cx="3467100" cy="76200"/>
+          </a:xfrm>
+          <a:prstGeom prst="rect">
+            <a:avLst/>
+          </a:prstGeom>
+          <a:noFill/>
+          <a:ln>
+            <a:solidFill>
+              <a:schemeClr val="accent3">
+                <a:lumMod val="75000"/>
+              </a:schemeClr>
+            </a:solidFill>
+          </a:ln>
+        </p:spPr>
+        <p:style>
+          <a:lnRef idx="2">
+            <a:schemeClr val="accent1">
+              <a:shade val="50000"/>
+            </a:schemeClr>
+          </a:lnRef>
+          <a:fillRef idx="1">
+            <a:schemeClr val="accent1"/>
+          </a:fillRef>
+          <a:effectRef idx="0">
+            <a:schemeClr val="accent1"/>
+          </a:effectRef>
+          <a:fontRef idx="minor">
+            <a:schemeClr val="lt1"/>
+          </a:fontRef>
+        </p:style>
+        <p:txBody>
+          <a:bodyPr rtlCol="0" anchor="ctr"/>
+          <a:lstStyle/>
+          <a:p>
+            <a:pPr algn="ctr"/>
+            <a:endParaRPr lang="en-US"/>
+          </a:p>
+        </p:txBody>
+      </p:sp>
+      <p:sp>
+        <p:nvSpPr>
+          <p:cNvPr id="40" name="Rectangle 39"/>
+          <p:cNvSpPr/>
+          <p:nvPr/>
+        </p:nvSpPr>
+        <p:spPr>
+          <a:xfrm>
+            <a:off x="5181600" y="2133600"/>
+            <a:ext cx="685800" cy="76200"/>
+          </a:xfrm>
+          <a:prstGeom prst="rect">
+            <a:avLst/>
+          </a:prstGeom>
+          <a:solidFill>
+            <a:schemeClr val="accent3">
+              <a:lumMod val="60000"/>
+              <a:lumOff val="40000"/>
+            </a:schemeClr>
+          </a:solidFill>
+          <a:ln>
+            <a:solidFill>
+              <a:schemeClr val="accent3">
+                <a:lumMod val="75000"/>
+              </a:schemeClr>
+            </a:solidFill>
+          </a:ln>
+        </p:spPr>
+        <p:style>
+          <a:lnRef idx="2">
+            <a:schemeClr val="accent1">
+              <a:shade val="50000"/>
+            </a:schemeClr>
+          </a:lnRef>
+          <a:fillRef idx="1">
+            <a:schemeClr val="accent1"/>
+          </a:fillRef>
+          <a:effectRef idx="0">
+            <a:schemeClr val="accent1"/>
+          </a:effectRef>
+          <a:fontRef idx="minor">
+            <a:schemeClr val="lt1"/>
+          </a:fontRef>
+        </p:style>
+        <p:txBody>
+          <a:bodyPr rtlCol="0" anchor="ctr"/>
+          <a:lstStyle/>
+          <a:p>
+            <a:pPr algn="ctr"/>
+            <a:endParaRPr lang="en-US"/>
+          </a:p>
+        </p:txBody>
+      </p:sp>
+      <p:sp>
+        <p:nvSpPr>
+          <p:cNvPr id="42" name="Rectangle 41"/>
+          <p:cNvSpPr/>
+          <p:nvPr/>
+        </p:nvSpPr>
+        <p:spPr>
+          <a:xfrm>
+            <a:off x="6172200" y="1828800"/>
+            <a:ext cx="685800" cy="228600"/>
+          </a:xfrm>
+          <a:prstGeom prst="rect">
+            <a:avLst/>
+          </a:prstGeom>
+        </p:spPr>
+        <p:style>
+          <a:lnRef idx="2">
+            <a:schemeClr val="accent1">
+              <a:shade val="50000"/>
+            </a:schemeClr>
+          </a:lnRef>
+          <a:fillRef idx="1">
+            <a:schemeClr val="accent1"/>
+          </a:fillRef>
+          <a:effectRef idx="0">
+            <a:schemeClr val="accent1"/>
+          </a:effectRef>
+          <a:fontRef idx="minor">
+            <a:schemeClr val="lt1"/>
+          </a:fontRef>
+        </p:style>
+        <p:txBody>
+          <a:bodyPr rtlCol="0" anchor="ctr"/>
+          <a:lstStyle/>
+          <a:p>
+            <a:pPr algn="ctr"/>
+            <a:r>
+              <a:rPr lang="en-US" sz="800" dirty="0" smtClean="0"/>
+              <a:t>Renovation</a:t>
+            </a:r>
+          </a:p>
+          <a:p>
+            <a:pPr algn="ctr"/>
+            <a:endParaRPr lang="en-US" sz="800" dirty="0"/>
+          </a:p>
+        </p:txBody>
+      </p:sp>
+      <p:sp>
+        <p:nvSpPr>
+          <p:cNvPr id="43" name="Rectangle 42"/>
+          <p:cNvSpPr/>
+          <p:nvPr/>
+        </p:nvSpPr>
+        <p:spPr>
+          <a:xfrm>
+            <a:off x="609600" y="1828800"/>
+            <a:ext cx="990600" cy="228600"/>
+          </a:xfrm>
+          <a:prstGeom prst="rect">
+            <a:avLst/>
+          </a:prstGeom>
+        </p:spPr>
+        <p:style>
+          <a:lnRef idx="2">
+            <a:schemeClr val="accent1">
+              <a:shade val="50000"/>
+            </a:schemeClr>
+          </a:lnRef>
+          <a:fillRef idx="1">
+            <a:schemeClr val="accent1"/>
+          </a:fillRef>
+          <a:effectRef idx="0">
+            <a:schemeClr val="accent1"/>
+          </a:effectRef>
+          <a:fontRef idx="minor">
+            <a:schemeClr val="lt1"/>
+          </a:fontRef>
+        </p:style>
+        <p:txBody>
+          <a:bodyPr rtlCol="0" anchor="ctr"/>
+          <a:lstStyle/>
+          <a:p>
+            <a:pPr algn="ctr"/>
+            <a:r>
+              <a:rPr lang="en-US" dirty="0" smtClean="0"/>
+              <a:t>Leased</a:t>
+            </a:r>
+            <a:endParaRPr lang="en-US" dirty="0"/>
+          </a:p>
+        </p:txBody>
+      </p:sp>
+      <p:sp>
+        <p:nvSpPr>
+          <p:cNvPr id="44" name="Rectangle 43"/>
+          <p:cNvSpPr/>
+          <p:nvPr/>
+        </p:nvSpPr>
+        <p:spPr>
+          <a:xfrm>
+            <a:off x="609600" y="2133600"/>
+            <a:ext cx="3467100" cy="76200"/>
+          </a:xfrm>
+          <a:prstGeom prst="rect">
+            <a:avLst/>
+          </a:prstGeom>
+          <a:noFill/>
+          <a:ln>
+            <a:solidFill>
+              <a:schemeClr val="accent3">
+                <a:lumMod val="75000"/>
+              </a:schemeClr>
+            </a:solidFill>
+          </a:ln>
+        </p:spPr>
+        <p:style>
+          <a:lnRef idx="2">
+            <a:schemeClr val="accent1">
+              <a:shade val="50000"/>
+            </a:schemeClr>
+          </a:lnRef>
+          <a:fillRef idx="1">
+            <a:schemeClr val="accent1"/>
+          </a:fillRef>
+          <a:effectRef idx="0">
+            <a:schemeClr val="accent1"/>
+          </a:effectRef>
+          <a:fontRef idx="minor">
+            <a:schemeClr val="lt1"/>
+          </a:fontRef>
+        </p:style>
+        <p:txBody>
+          <a:bodyPr rtlCol="0" anchor="ctr"/>
+          <a:lstStyle/>
+          <a:p>
+            <a:pPr algn="ctr"/>
+            <a:endParaRPr lang="en-US"/>
+          </a:p>
+        </p:txBody>
+      </p:sp>
+      <p:sp>
+        <p:nvSpPr>
+          <p:cNvPr id="45" name="Rectangle 44"/>
+          <p:cNvSpPr/>
+          <p:nvPr/>
+        </p:nvSpPr>
+        <p:spPr>
+          <a:xfrm>
+            <a:off x="609600" y="2133600"/>
+            <a:ext cx="685800" cy="76200"/>
+          </a:xfrm>
+          <a:prstGeom prst="rect">
+            <a:avLst/>
+          </a:prstGeom>
+          <a:solidFill>
+            <a:schemeClr val="accent3">
+              <a:lumMod val="60000"/>
+              <a:lumOff val="40000"/>
+            </a:schemeClr>
+          </a:solidFill>
+          <a:ln>
+            <a:solidFill>
+              <a:schemeClr val="accent3">
+                <a:lumMod val="75000"/>
+              </a:schemeClr>
+            </a:solidFill>
+          </a:ln>
+        </p:spPr>
+        <p:style>
+          <a:lnRef idx="2">
+            <a:schemeClr val="accent1">
+              <a:shade val="50000"/>
+            </a:schemeClr>
+          </a:lnRef>
+          <a:fillRef idx="1">
+            <a:schemeClr val="accent1"/>
+          </a:fillRef>
+          <a:effectRef idx="0">
+            <a:schemeClr val="accent1"/>
+          </a:effectRef>
+          <a:fontRef idx="minor">
+            <a:schemeClr val="lt1"/>
+          </a:fontRef>
+        </p:style>
+        <p:txBody>
+          <a:bodyPr rtlCol="0" anchor="ctr"/>
+          <a:lstStyle/>
+          <a:p>
+            <a:pPr algn="ctr"/>
+            <a:endParaRPr lang="en-US"/>
+          </a:p>
+        </p:txBody>
+      </p:sp>
+      <p:sp>
+        <p:nvSpPr>
+          <p:cNvPr id="46" name="Rectangle 45"/>
+          <p:cNvSpPr/>
+          <p:nvPr/>
+        </p:nvSpPr>
+        <p:spPr>
+          <a:xfrm>
+            <a:off x="1600200" y="1828800"/>
+            <a:ext cx="2514600" cy="228600"/>
+          </a:xfrm>
+          <a:prstGeom prst="rect">
+            <a:avLst/>
+          </a:prstGeom>
+          <a:gradFill>
+            <a:gsLst>
+              <a:gs pos="0">
+                <a:schemeClr val="accent1">
+                  <a:lumMod val="75000"/>
+                </a:schemeClr>
+              </a:gs>
+              <a:gs pos="50000">
+                <a:schemeClr val="accent1">
+                  <a:tint val="44500"/>
+                  <a:satMod val="160000"/>
+                </a:schemeClr>
+              </a:gs>
+              <a:gs pos="100000">
+                <a:schemeClr val="accent1">
+                  <a:tint val="23500"/>
+                  <a:satMod val="160000"/>
+                </a:schemeClr>
+              </a:gs>
+            </a:gsLst>
+            <a:lin ang="0" scaled="1"/>
+          </a:gradFill>
+          <a:ln>
+            <a:gradFill flip="none" rotWithShape="1">
+              <a:gsLst>
+                <a:gs pos="0">
+                  <a:schemeClr val="tx2">
+                    <a:lumMod val="50000"/>
+                  </a:schemeClr>
+                </a:gs>
+                <a:gs pos="50000">
+                  <a:schemeClr val="accent1">
+                    <a:tint val="44500"/>
+                    <a:satMod val="160000"/>
+                  </a:schemeClr>
+                </a:gs>
+                <a:gs pos="100000">
+                  <a:schemeClr val="accent1">
+                    <a:tint val="23500"/>
+                    <a:satMod val="160000"/>
+                  </a:schemeClr>
+                </a:gs>
+              </a:gsLst>
+              <a:lin ang="0" scaled="1"/>
+              <a:tileRect/>
+            </a:gradFill>
+          </a:ln>
+        </p:spPr>
+        <p:style>
+          <a:lnRef idx="2">
+            <a:schemeClr val="accent1">
+              <a:shade val="50000"/>
+            </a:schemeClr>
+          </a:lnRef>
+          <a:fillRef idx="1">
+            <a:schemeClr val="accent1"/>
+          </a:fillRef>
+          <a:effectRef idx="0">
+            <a:schemeClr val="accent1"/>
+          </a:effectRef>
+          <a:fontRef idx="minor">
+            <a:schemeClr val="lt1"/>
+          </a:fontRef>
+        </p:style>
+        <p:txBody>
+          <a:bodyPr rtlCol="0" anchor="ctr"/>
+          <a:lstStyle/>
+          <a:p>
+            <a:pPr algn="ctr"/>
+            <a:r>
+              <a:rPr lang="en-US" dirty="0" smtClean="0"/>
+              <a:t>Vacant</a:t>
+            </a:r>
+            <a:endParaRPr lang="en-US" dirty="0"/>
+          </a:p>
+        </p:txBody>
+      </p:sp>
+      <p:sp>
+        <p:nvSpPr>
+          <p:cNvPr id="47" name="Rectangle 46"/>
+          <p:cNvSpPr/>
+          <p:nvPr/>
+        </p:nvSpPr>
+        <p:spPr>
+          <a:xfrm>
+            <a:off x="609600" y="2971800"/>
+            <a:ext cx="990600" cy="228600"/>
+          </a:xfrm>
+          <a:prstGeom prst="rect">
+            <a:avLst/>
+          </a:prstGeom>
+        </p:spPr>
+        <p:style>
+          <a:lnRef idx="2">
+            <a:schemeClr val="accent1">
+              <a:shade val="50000"/>
+            </a:schemeClr>
+          </a:lnRef>
+          <a:fillRef idx="1">
+            <a:schemeClr val="accent1"/>
+          </a:fillRef>
+          <a:effectRef idx="0">
+            <a:schemeClr val="accent1"/>
+          </a:effectRef>
+          <a:fontRef idx="minor">
+            <a:schemeClr val="lt1"/>
+          </a:fontRef>
+        </p:style>
+        <p:txBody>
+          <a:bodyPr rtlCol="0" anchor="ctr"/>
+          <a:lstStyle/>
+          <a:p>
+            <a:pPr algn="ctr"/>
+            <a:r>
+              <a:rPr lang="en-US" dirty="0" smtClean="0"/>
+              <a:t>Leased</a:t>
+            </a:r>
+            <a:endParaRPr lang="en-US" dirty="0"/>
+          </a:p>
+        </p:txBody>
+      </p:sp>
+      <p:sp>
+        <p:nvSpPr>
+          <p:cNvPr id="48" name="Rectangle 47"/>
+          <p:cNvSpPr/>
+          <p:nvPr/>
+        </p:nvSpPr>
+        <p:spPr>
+          <a:xfrm>
+            <a:off x="609600" y="3276600"/>
+            <a:ext cx="3467100" cy="76200"/>
+          </a:xfrm>
+          <a:prstGeom prst="rect">
+            <a:avLst/>
+          </a:prstGeom>
+          <a:noFill/>
+          <a:ln>
+            <a:solidFill>
+              <a:schemeClr val="accent3">
+                <a:lumMod val="75000"/>
+              </a:schemeClr>
+            </a:solidFill>
+          </a:ln>
+        </p:spPr>
+        <p:style>
+          <a:lnRef idx="2">
+            <a:schemeClr val="accent1">
+              <a:shade val="50000"/>
+            </a:schemeClr>
+          </a:lnRef>
+          <a:fillRef idx="1">
+            <a:schemeClr val="accent1"/>
+          </a:fillRef>
+          <a:effectRef idx="0">
+            <a:schemeClr val="accent1"/>
+          </a:effectRef>
+          <a:fontRef idx="minor">
+            <a:schemeClr val="lt1"/>
+          </a:fontRef>
+        </p:style>
+        <p:txBody>
+          <a:bodyPr rtlCol="0" anchor="ctr"/>
+          <a:lstStyle/>
+          <a:p>
+            <a:pPr algn="ctr"/>
+            <a:endParaRPr lang="en-US"/>
+          </a:p>
+        </p:txBody>
+      </p:sp>
+      <p:sp>
+        <p:nvSpPr>
+          <p:cNvPr id="49" name="Rectangle 48"/>
+          <p:cNvSpPr/>
+          <p:nvPr/>
+        </p:nvSpPr>
+        <p:spPr>
+          <a:xfrm>
+            <a:off x="609600" y="3276600"/>
+            <a:ext cx="1143000" cy="76200"/>
+          </a:xfrm>
+          <a:prstGeom prst="rect">
+            <a:avLst/>
+          </a:prstGeom>
+          <a:solidFill>
+            <a:schemeClr val="accent3">
+              <a:lumMod val="60000"/>
+              <a:lumOff val="40000"/>
+            </a:schemeClr>
+          </a:solidFill>
+          <a:ln>
+            <a:solidFill>
+              <a:schemeClr val="accent3">
+                <a:lumMod val="75000"/>
+              </a:schemeClr>
+            </a:solidFill>
+          </a:ln>
+        </p:spPr>
+        <p:style>
+          <a:lnRef idx="2">
+            <a:schemeClr val="accent1">
+              <a:shade val="50000"/>
+            </a:schemeClr>
+          </a:lnRef>
+          <a:fillRef idx="1">
+            <a:schemeClr val="accent1"/>
+          </a:fillRef>
+          <a:effectRef idx="0">
+            <a:schemeClr val="accent1"/>
+          </a:effectRef>
+          <a:fontRef idx="minor">
+            <a:schemeClr val="lt1"/>
+          </a:fontRef>
+        </p:style>
+        <p:txBody>
+          <a:bodyPr rtlCol="0" anchor="ctr"/>
+          <a:lstStyle/>
+          <a:p>
+            <a:pPr algn="ctr"/>
+            <a:endParaRPr lang="en-US"/>
+          </a:p>
+        </p:txBody>
+      </p:sp>
+      <p:sp>
+        <p:nvSpPr>
+          <p:cNvPr id="51" name="Rectangle 50"/>
+          <p:cNvSpPr/>
+          <p:nvPr/>
+        </p:nvSpPr>
+        <p:spPr>
+          <a:xfrm>
+            <a:off x="1600200" y="2971800"/>
+            <a:ext cx="685800" cy="228600"/>
+          </a:xfrm>
+          <a:prstGeom prst="rect">
+            <a:avLst/>
+          </a:prstGeom>
+        </p:spPr>
+        <p:style>
+          <a:lnRef idx="2">
+            <a:schemeClr val="accent1">
+              <a:shade val="50000"/>
+            </a:schemeClr>
+          </a:lnRef>
+          <a:fillRef idx="1">
+            <a:schemeClr val="accent1"/>
+          </a:fillRef>
+          <a:effectRef idx="0">
+            <a:schemeClr val="accent1"/>
+          </a:effectRef>
+          <a:fontRef idx="minor">
+            <a:schemeClr val="lt1"/>
+          </a:fontRef>
+        </p:style>
+        <p:txBody>
+          <a:bodyPr rtlCol="0" anchor="ctr"/>
+          <a:lstStyle/>
+          <a:p>
+            <a:pPr algn="ctr"/>
+            <a:r>
+              <a:rPr lang="en-US" sz="800" dirty="0" smtClean="0"/>
+              <a:t>Renovation</a:t>
+            </a:r>
+          </a:p>
+          <a:p>
+            <a:pPr algn="ctr"/>
+            <a:endParaRPr lang="en-US" sz="800" dirty="0"/>
+          </a:p>
+        </p:txBody>
+      </p:sp>
+      <p:sp>
+        <p:nvSpPr>
+          <p:cNvPr id="52" name="Down Arrow 51"/>
+          <p:cNvSpPr/>
+          <p:nvPr/>
+        </p:nvSpPr>
+        <p:spPr>
+          <a:xfrm rot="10800000">
+            <a:off x="1676400" y="3392741"/>
+            <a:ext cx="152400" cy="188658"/>
+          </a:xfrm>
+          <a:prstGeom prst="downArrow">
+            <a:avLst/>
+          </a:prstGeom>
+        </p:spPr>
+        <p:style>
+          <a:lnRef idx="2">
+            <a:schemeClr val="accent1">
+              <a:shade val="50000"/>
+            </a:schemeClr>
+          </a:lnRef>
+          <a:fillRef idx="1">
+            <a:schemeClr val="accent1"/>
+          </a:fillRef>
+          <a:effectRef idx="0">
+            <a:schemeClr val="accent1"/>
+          </a:effectRef>
+          <a:fontRef idx="minor">
+            <a:schemeClr val="lt1"/>
+          </a:fontRef>
+        </p:style>
+        <p:txBody>
+          <a:bodyPr rtlCol="0" anchor="ctr"/>
+          <a:lstStyle/>
+          <a:p>
+            <a:pPr algn="ctr"/>
+            <a:endParaRPr lang="en-US"/>
+          </a:p>
+        </p:txBody>
+      </p:sp>
+      <p:sp>
+        <p:nvSpPr>
+          <p:cNvPr id="53" name="TextBox 52"/>
+          <p:cNvSpPr txBox="1"/>
+          <p:nvPr/>
+        </p:nvSpPr>
+        <p:spPr>
+          <a:xfrm>
+            <a:off x="1447800" y="3505200"/>
+            <a:ext cx="990599" cy="276999"/>
+          </a:xfrm>
+          <a:prstGeom prst="rect">
+            <a:avLst/>
+          </a:prstGeom>
+          <a:noFill/>
+        </p:spPr>
+        <p:txBody>
+          <a:bodyPr wrap="square" rtlCol="0">
+            <a:spAutoFit/>
+          </a:bodyPr>
+          <a:lstStyle/>
+          <a:p>
+            <a:r>
+              <a:rPr lang="en-US" sz="1200" dirty="0" smtClean="0"/>
+              <a:t>Leased</a:t>
+            </a:r>
+          </a:p>
+        </p:txBody>
+      </p:sp>
+      <p:sp>
+        <p:nvSpPr>
+          <p:cNvPr id="54" name="TextBox 53"/>
+          <p:cNvSpPr txBox="1"/>
+          <p:nvPr/>
+        </p:nvSpPr>
+        <p:spPr>
+          <a:xfrm>
+            <a:off x="152400" y="2971800"/>
+            <a:ext cx="301686" cy="369332"/>
+          </a:xfrm>
+          <a:prstGeom prst="rect">
+            <a:avLst/>
+          </a:prstGeom>
+          <a:noFill/>
+        </p:spPr>
+        <p:txBody>
+          <a:bodyPr wrap="none" rtlCol="0">
+            <a:spAutoFit/>
+          </a:bodyPr>
+          <a:lstStyle/>
+          <a:p>
+            <a:r>
+              <a:rPr lang="en-US" dirty="0" smtClean="0"/>
+              <a:t>3</a:t>
+            </a:r>
+            <a:endParaRPr lang="en-US" dirty="0"/>
+          </a:p>
+        </p:txBody>
+      </p:sp>
+      <p:sp>
+        <p:nvSpPr>
+          <p:cNvPr id="55" name="Right Arrow 54"/>
+          <p:cNvSpPr/>
+          <p:nvPr/>
+        </p:nvSpPr>
+        <p:spPr>
+          <a:xfrm>
+            <a:off x="4419600" y="2971800"/>
+            <a:ext cx="426719" cy="304800"/>
+          </a:xfrm>
+          <a:prstGeom prst="rightArrow">
+            <a:avLst/>
+          </a:prstGeom>
+        </p:spPr>
+        <p:style>
+          <a:lnRef idx="2">
+            <a:schemeClr val="accent1">
+              <a:shade val="50000"/>
+            </a:schemeClr>
+          </a:lnRef>
+          <a:fillRef idx="1">
+            <a:schemeClr val="accent1"/>
+          </a:fillRef>
+          <a:effectRef idx="0">
+            <a:schemeClr val="accent1"/>
+          </a:effectRef>
+          <a:fontRef idx="minor">
+            <a:schemeClr val="lt1"/>
+          </a:fontRef>
+        </p:style>
+        <p:txBody>
+          <a:bodyPr rtlCol="0" anchor="ctr"/>
+          <a:lstStyle/>
+          <a:p>
+            <a:pPr algn="ctr"/>
+            <a:endParaRPr lang="en-US"/>
+          </a:p>
+        </p:txBody>
+      </p:sp>
+      <p:sp>
+        <p:nvSpPr>
+          <p:cNvPr id="56" name="Rectangle 55"/>
+          <p:cNvSpPr/>
+          <p:nvPr/>
+        </p:nvSpPr>
+        <p:spPr>
+          <a:xfrm>
+            <a:off x="5181600" y="2971800"/>
+            <a:ext cx="990600" cy="228600"/>
+          </a:xfrm>
+          <a:prstGeom prst="rect">
+            <a:avLst/>
+          </a:prstGeom>
+        </p:spPr>
+        <p:style>
+          <a:lnRef idx="2">
+            <a:schemeClr val="accent1">
+              <a:shade val="50000"/>
+            </a:schemeClr>
+          </a:lnRef>
+          <a:fillRef idx="1">
+            <a:schemeClr val="accent1"/>
+          </a:fillRef>
+          <a:effectRef idx="0">
+            <a:schemeClr val="accent1"/>
+          </a:effectRef>
+          <a:fontRef idx="minor">
+            <a:schemeClr val="lt1"/>
+          </a:fontRef>
+        </p:style>
+        <p:txBody>
+          <a:bodyPr rtlCol="0" anchor="ctr"/>
+          <a:lstStyle/>
+          <a:p>
+            <a:pPr algn="ctr"/>
+            <a:r>
+              <a:rPr lang="en-US" dirty="0" smtClean="0"/>
+              <a:t>Leased</a:t>
+            </a:r>
+            <a:endParaRPr lang="en-US" dirty="0"/>
+          </a:p>
+        </p:txBody>
+      </p:sp>
+      <p:sp>
+        <p:nvSpPr>
+          <p:cNvPr id="57" name="Rectangle 56"/>
+          <p:cNvSpPr/>
+          <p:nvPr/>
+        </p:nvSpPr>
+        <p:spPr>
+          <a:xfrm>
+            <a:off x="5181600" y="3276600"/>
+            <a:ext cx="3467100" cy="76200"/>
+          </a:xfrm>
+          <a:prstGeom prst="rect">
+            <a:avLst/>
+          </a:prstGeom>
+          <a:noFill/>
+          <a:ln>
+            <a:solidFill>
+              <a:schemeClr val="accent3">
+                <a:lumMod val="75000"/>
+              </a:schemeClr>
+            </a:solidFill>
+          </a:ln>
+        </p:spPr>
+        <p:style>
+          <a:lnRef idx="2">
+            <a:schemeClr val="accent1">
+              <a:shade val="50000"/>
+            </a:schemeClr>
+          </a:lnRef>
+          <a:fillRef idx="1">
+            <a:schemeClr val="accent1"/>
+          </a:fillRef>
+          <a:effectRef idx="0">
+            <a:schemeClr val="accent1"/>
+          </a:effectRef>
+          <a:fontRef idx="minor">
+            <a:schemeClr val="lt1"/>
+          </a:fontRef>
+        </p:style>
+        <p:txBody>
+          <a:bodyPr rtlCol="0" anchor="ctr"/>
+          <a:lstStyle/>
+          <a:p>
+            <a:pPr algn="ctr"/>
+            <a:endParaRPr lang="en-US"/>
+          </a:p>
+        </p:txBody>
+      </p:sp>
+      <p:sp>
+        <p:nvSpPr>
+          <p:cNvPr id="58" name="Rectangle 57"/>
+          <p:cNvSpPr/>
+          <p:nvPr/>
+        </p:nvSpPr>
+        <p:spPr>
+          <a:xfrm>
+            <a:off x="5181600" y="3276600"/>
+            <a:ext cx="1143000" cy="76200"/>
+          </a:xfrm>
+          <a:prstGeom prst="rect">
+            <a:avLst/>
+          </a:prstGeom>
+          <a:solidFill>
+            <a:schemeClr val="accent3">
+              <a:lumMod val="60000"/>
+              <a:lumOff val="40000"/>
+            </a:schemeClr>
+          </a:solidFill>
+          <a:ln>
+            <a:solidFill>
+              <a:schemeClr val="accent3">
+                <a:lumMod val="75000"/>
+              </a:schemeClr>
+            </a:solidFill>
+          </a:ln>
+        </p:spPr>
+        <p:style>
+          <a:lnRef idx="2">
+            <a:schemeClr val="accent1">
+              <a:shade val="50000"/>
+            </a:schemeClr>
+          </a:lnRef>
+          <a:fillRef idx="1">
+            <a:schemeClr val="accent1"/>
+          </a:fillRef>
+          <a:effectRef idx="0">
+            <a:schemeClr val="accent1"/>
+          </a:effectRef>
+          <a:fontRef idx="minor">
+            <a:schemeClr val="lt1"/>
+          </a:fontRef>
+        </p:style>
+        <p:txBody>
+          <a:bodyPr rtlCol="0" anchor="ctr"/>
+          <a:lstStyle/>
+          <a:p>
+            <a:pPr algn="ctr"/>
+            <a:endParaRPr lang="en-US"/>
+          </a:p>
+        </p:txBody>
+      </p:sp>
+      <p:sp>
+        <p:nvSpPr>
+          <p:cNvPr id="60" name="Rectangle 59"/>
+          <p:cNvSpPr/>
+          <p:nvPr/>
+        </p:nvSpPr>
+        <p:spPr>
+          <a:xfrm>
+            <a:off x="6172200" y="2971800"/>
+            <a:ext cx="685800" cy="228600"/>
+          </a:xfrm>
+          <a:prstGeom prst="rect">
+            <a:avLst/>
+          </a:prstGeom>
+        </p:spPr>
+        <p:style>
+          <a:lnRef idx="2">
+            <a:schemeClr val="accent1">
+              <a:shade val="50000"/>
+            </a:schemeClr>
+          </a:lnRef>
+          <a:fillRef idx="1">
+            <a:schemeClr val="accent1"/>
+          </a:fillRef>
+          <a:effectRef idx="0">
+            <a:schemeClr val="accent1"/>
+          </a:effectRef>
+          <a:fontRef idx="minor">
+            <a:schemeClr val="lt1"/>
+          </a:fontRef>
+        </p:style>
+        <p:txBody>
+          <a:bodyPr rtlCol="0" anchor="ctr"/>
+          <a:lstStyle/>
+          <a:p>
+            <a:pPr algn="ctr"/>
+            <a:r>
+              <a:rPr lang="en-US" sz="800" dirty="0" smtClean="0"/>
+              <a:t>Renovation</a:t>
+            </a:r>
+          </a:p>
+          <a:p>
+            <a:pPr algn="ctr"/>
+            <a:endParaRPr lang="en-US" sz="800" dirty="0"/>
+          </a:p>
+        </p:txBody>
+      </p:sp>
+      <p:sp>
+        <p:nvSpPr>
+          <p:cNvPr id="61" name="Rectangle 60"/>
+          <p:cNvSpPr/>
+          <p:nvPr/>
+        </p:nvSpPr>
+        <p:spPr>
+          <a:xfrm>
+            <a:off x="6858000" y="2971800"/>
+            <a:ext cx="609600" cy="228600"/>
+          </a:xfrm>
+          <a:prstGeom prst="rect">
+            <a:avLst/>
+          </a:prstGeom>
+        </p:spPr>
+        <p:style>
+          <a:lnRef idx="2">
+            <a:schemeClr val="accent1">
+              <a:shade val="50000"/>
+            </a:schemeClr>
+          </a:lnRef>
+          <a:fillRef idx="1">
+            <a:schemeClr val="accent1"/>
+          </a:fillRef>
+          <a:effectRef idx="0">
+            <a:schemeClr val="accent1"/>
+          </a:effectRef>
+          <a:fontRef idx="minor">
+            <a:schemeClr val="lt1"/>
+          </a:fontRef>
+        </p:style>
+        <p:txBody>
+          <a:bodyPr rtlCol="0" anchor="ctr"/>
+          <a:lstStyle/>
+          <a:p>
+            <a:pPr algn="ctr"/>
+            <a:r>
+              <a:rPr lang="en-US" sz="800" dirty="0" smtClean="0"/>
+              <a:t>Reserved</a:t>
+            </a:r>
+          </a:p>
+          <a:p>
+            <a:pPr algn="ctr"/>
+            <a:endParaRPr lang="en-US" sz="800" dirty="0"/>
+          </a:p>
+        </p:txBody>
+      </p:sp>
+      <p:sp>
+        <p:nvSpPr>
+          <p:cNvPr id="50" name="Rectangle 49"/>
+          <p:cNvSpPr/>
+          <p:nvPr/>
+        </p:nvSpPr>
+        <p:spPr>
+          <a:xfrm>
+            <a:off x="2286000" y="2971800"/>
+            <a:ext cx="1828800" cy="228600"/>
+          </a:xfrm>
+          <a:prstGeom prst="rect">
+            <a:avLst/>
+          </a:prstGeom>
+          <a:gradFill>
+            <a:gsLst>
+              <a:gs pos="0">
+                <a:schemeClr val="accent1">
+                  <a:lumMod val="75000"/>
+                </a:schemeClr>
+              </a:gs>
+              <a:gs pos="50000">
+                <a:schemeClr val="accent1">
+                  <a:tint val="44500"/>
+                  <a:satMod val="160000"/>
+                </a:schemeClr>
+              </a:gs>
+              <a:gs pos="100000">
+                <a:schemeClr val="accent1">
+                  <a:tint val="23500"/>
+                  <a:satMod val="160000"/>
+                </a:schemeClr>
+              </a:gs>
+            </a:gsLst>
+            <a:lin ang="0" scaled="1"/>
+          </a:gradFill>
+          <a:ln>
+            <a:gradFill flip="none" rotWithShape="1">
+              <a:gsLst>
+                <a:gs pos="0">
+                  <a:schemeClr val="tx2">
+                    <a:lumMod val="50000"/>
+                  </a:schemeClr>
+                </a:gs>
+                <a:gs pos="50000">
+                  <a:schemeClr val="accent1">
+                    <a:tint val="44500"/>
+                    <a:satMod val="160000"/>
+                  </a:schemeClr>
+                </a:gs>
+                <a:gs pos="100000">
+                  <a:schemeClr val="accent1">
+                    <a:tint val="23500"/>
+                    <a:satMod val="160000"/>
+                  </a:schemeClr>
+                </a:gs>
+              </a:gsLst>
+              <a:lin ang="0" scaled="1"/>
+              <a:tileRect/>
+            </a:gradFill>
+          </a:ln>
+        </p:spPr>
+        <p:style>
+          <a:lnRef idx="2">
+            <a:schemeClr val="accent1">
+              <a:shade val="50000"/>
+            </a:schemeClr>
+          </a:lnRef>
+          <a:fillRef idx="1">
+            <a:schemeClr val="accent1"/>
+          </a:fillRef>
+          <a:effectRef idx="0">
+            <a:schemeClr val="accent1"/>
+          </a:effectRef>
+          <a:fontRef idx="minor">
+            <a:schemeClr val="lt1"/>
+          </a:fontRef>
+        </p:style>
+        <p:txBody>
+          <a:bodyPr rtlCol="0" anchor="ctr"/>
+          <a:lstStyle/>
+          <a:p>
+            <a:pPr algn="ctr"/>
+            <a:r>
+              <a:rPr lang="en-US" dirty="0" smtClean="0"/>
+              <a:t>Available</a:t>
+            </a:r>
+            <a:endParaRPr lang="en-US" dirty="0"/>
+          </a:p>
+        </p:txBody>
+      </p:sp>
+      <p:sp>
+        <p:nvSpPr>
+          <p:cNvPr id="41" name="Rectangle 40"/>
+          <p:cNvSpPr/>
+          <p:nvPr/>
+        </p:nvSpPr>
+        <p:spPr>
+          <a:xfrm>
+            <a:off x="6858000" y="1828800"/>
+            <a:ext cx="1828800" cy="228600"/>
+          </a:xfrm>
+          <a:prstGeom prst="rect">
+            <a:avLst/>
+          </a:prstGeom>
+          <a:gradFill>
+            <a:gsLst>
+              <a:gs pos="0">
+                <a:schemeClr val="accent1">
+                  <a:lumMod val="75000"/>
+                </a:schemeClr>
+              </a:gs>
+              <a:gs pos="50000">
+                <a:schemeClr val="accent1">
+                  <a:tint val="44500"/>
+                  <a:satMod val="160000"/>
+                </a:schemeClr>
+              </a:gs>
+              <a:gs pos="100000">
+                <a:schemeClr val="accent1">
+                  <a:tint val="23500"/>
+                  <a:satMod val="160000"/>
+                </a:schemeClr>
+              </a:gs>
+            </a:gsLst>
+            <a:lin ang="0" scaled="1"/>
+          </a:gradFill>
+          <a:ln>
+            <a:gradFill flip="none" rotWithShape="1">
+              <a:gsLst>
+                <a:gs pos="0">
+                  <a:schemeClr val="tx2">
+                    <a:lumMod val="50000"/>
+                  </a:schemeClr>
+                </a:gs>
+                <a:gs pos="50000">
+                  <a:schemeClr val="accent1">
+                    <a:tint val="44500"/>
+                    <a:satMod val="160000"/>
+                  </a:schemeClr>
+                </a:gs>
+                <a:gs pos="100000">
+                  <a:schemeClr val="accent1">
+                    <a:tint val="23500"/>
+                    <a:satMod val="160000"/>
+                  </a:schemeClr>
+                </a:gs>
+              </a:gsLst>
+              <a:lin ang="0" scaled="1"/>
+              <a:tileRect/>
+            </a:gradFill>
+          </a:ln>
+        </p:spPr>
+        <p:style>
+          <a:lnRef idx="2">
+            <a:schemeClr val="accent1">
+              <a:shade val="50000"/>
+            </a:schemeClr>
+          </a:lnRef>
+          <a:fillRef idx="1">
+            <a:schemeClr val="accent1"/>
+          </a:fillRef>
+          <a:effectRef idx="0">
+            <a:schemeClr val="accent1"/>
+          </a:effectRef>
+          <a:fontRef idx="minor">
+            <a:schemeClr val="lt1"/>
+          </a:fontRef>
+        </p:style>
+        <p:txBody>
+          <a:bodyPr rtlCol="0" anchor="ctr"/>
+          <a:lstStyle/>
+          <a:p>
+            <a:pPr algn="ctr"/>
+            <a:r>
+              <a:rPr lang="en-US" dirty="0" smtClean="0"/>
+              <a:t>Available</a:t>
+            </a:r>
+            <a:endParaRPr lang="en-US" dirty="0"/>
+          </a:p>
+        </p:txBody>
+      </p:sp>
+      <p:sp>
+        <p:nvSpPr>
+          <p:cNvPr id="59" name="Rectangle 58"/>
+          <p:cNvSpPr/>
+          <p:nvPr/>
+        </p:nvSpPr>
+        <p:spPr>
+          <a:xfrm>
+            <a:off x="7467600" y="2971800"/>
+            <a:ext cx="1219200" cy="228600"/>
+          </a:xfrm>
+          <a:prstGeom prst="rect">
+            <a:avLst/>
+          </a:prstGeom>
+          <a:gradFill>
+            <a:gsLst>
+              <a:gs pos="0">
+                <a:schemeClr val="accent1">
+                  <a:lumMod val="75000"/>
+                </a:schemeClr>
+              </a:gs>
+              <a:gs pos="50000">
+                <a:schemeClr val="accent1">
+                  <a:tint val="44500"/>
+                  <a:satMod val="160000"/>
+                </a:schemeClr>
+              </a:gs>
+              <a:gs pos="100000">
+                <a:schemeClr val="accent1">
+                  <a:tint val="23500"/>
+                  <a:satMod val="160000"/>
+                </a:schemeClr>
+              </a:gs>
+            </a:gsLst>
+            <a:lin ang="0" scaled="1"/>
+          </a:gradFill>
+          <a:ln>
+            <a:gradFill flip="none" rotWithShape="1">
+              <a:gsLst>
+                <a:gs pos="0">
+                  <a:schemeClr val="tx2">
+                    <a:lumMod val="50000"/>
+                  </a:schemeClr>
+                </a:gs>
+                <a:gs pos="50000">
+                  <a:schemeClr val="accent1">
+                    <a:tint val="44500"/>
+                    <a:satMod val="160000"/>
+                  </a:schemeClr>
+                </a:gs>
+                <a:gs pos="100000">
+                  <a:schemeClr val="accent1">
+                    <a:tint val="23500"/>
+                    <a:satMod val="160000"/>
+                  </a:schemeClr>
+                </a:gs>
+              </a:gsLst>
+              <a:lin ang="0" scaled="1"/>
+              <a:tileRect/>
+            </a:gradFill>
+          </a:ln>
+        </p:spPr>
+        <p:style>
+          <a:lnRef idx="2">
+            <a:schemeClr val="accent1">
+              <a:shade val="50000"/>
+            </a:schemeClr>
+          </a:lnRef>
+          <a:fillRef idx="1">
+            <a:schemeClr val="accent1"/>
+          </a:fillRef>
+          <a:effectRef idx="0">
+            <a:schemeClr val="accent1"/>
+          </a:effectRef>
+          <a:fontRef idx="minor">
+            <a:schemeClr val="lt1"/>
+          </a:fontRef>
+        </p:style>
+        <p:txBody>
+          <a:bodyPr rtlCol="0" anchor="ctr"/>
+          <a:lstStyle/>
+          <a:p>
+            <a:pPr algn="ctr"/>
+            <a:r>
+              <a:rPr lang="en-US" dirty="0" smtClean="0"/>
+              <a:t>Leased</a:t>
+            </a:r>
+            <a:endParaRPr lang="en-US" dirty="0"/>
           </a:p>
         </p:txBody>
       </p:sp>

</xml_diff>